<commit_message>
Emilia: Kleine Änderung Powerpoint
</commit_message>
<xml_diff>
--- a/Angewandte_Mathe_Feigenbaum.pptx
+++ b/Angewandte_Mathe_Feigenbaum.pptx
@@ -1115,7 +1115,7 @@
       </p:grpSpPr>
       <p:sp>
         <p:nvSpPr>
-          <p:cNvPr id="134" name="Google Shape;134;g2e8ace2c8f6_0_0:notes"/>
+          <p:cNvPr id="134" name="Google Shape;134;g2e812756d4b_0_75:notes"/>
           <p:cNvSpPr/>
           <p:nvPr>
             <p:ph idx="2" type="sldImg"/>
@@ -1150,7 +1150,7 @@
       </p:sp>
       <p:sp>
         <p:nvSpPr>
-          <p:cNvPr id="135" name="Google Shape;135;g2e8ace2c8f6_0_0:notes"/>
+          <p:cNvPr id="135" name="Google Shape;135;g2e812756d4b_0_75:notes"/>
           <p:cNvSpPr txBox="1"/>
           <p:nvPr>
             <p:ph idx="1" type="body"/>
@@ -1214,7 +1214,7 @@
       </p:grpSpPr>
       <p:sp>
         <p:nvSpPr>
-          <p:cNvPr id="140" name="Google Shape;140;g2e812756d4b_0_75:notes"/>
+          <p:cNvPr id="140" name="Google Shape;140;g2e8ace2c8f6_0_0:notes"/>
           <p:cNvSpPr/>
           <p:nvPr>
             <p:ph idx="2" type="sldImg"/>
@@ -1249,7 +1249,7 @@
       </p:sp>
       <p:sp>
         <p:nvSpPr>
-          <p:cNvPr id="141" name="Google Shape;141;g2e812756d4b_0_75:notes"/>
+          <p:cNvPr id="141" name="Google Shape;141;g2e8ace2c8f6_0_0:notes"/>
           <p:cNvSpPr txBox="1"/>
           <p:nvPr>
             <p:ph idx="1" type="body"/>
@@ -7531,7 +7531,7 @@
             </a:pPr>
             <a:r>
               <a:rPr lang="de"/>
-              <a:t>Feigenbaum-Diagramm: Warum dieser Bereich von r?</a:t>
+              <a:t>Logistische Rekursion mit 3 Häufungspunkten</a:t>
             </a:r>
             <a:endParaRPr/>
           </a:p>
@@ -7553,8 +7553,8 @@
         </p:blipFill>
         <p:spPr>
           <a:xfrm>
-            <a:off x="1653200" y="1017725"/>
-            <a:ext cx="5837601" cy="3820975"/>
+            <a:off x="1507163" y="1017725"/>
+            <a:ext cx="6129668" cy="3820975"/>
           </a:xfrm>
           <a:prstGeom prst="rect">
             <a:avLst/>
@@ -7624,7 +7624,7 @@
             </a:pPr>
             <a:r>
               <a:rPr lang="de"/>
-              <a:t>Logistische Rekursion mit 3 Häufungspunkten</a:t>
+              <a:t>Feigenbaum-Diagramm: Warum dieser Bereich von r?</a:t>
             </a:r>
             <a:endParaRPr/>
           </a:p>
@@ -7646,8 +7646,8 @@
         </p:blipFill>
         <p:spPr>
           <a:xfrm>
-            <a:off x="1507163" y="1017725"/>
-            <a:ext cx="6129668" cy="3820975"/>
+            <a:off x="1653200" y="1017725"/>
+            <a:ext cx="5837601" cy="3820975"/>
           </a:xfrm>
           <a:prstGeom prst="rect">
             <a:avLst/>

</xml_diff>